<commit_message>
added images to my slides
</commit_message>
<xml_diff>
--- a/Final Project.pptx
+++ b/Final Project.pptx
@@ -113,6 +113,11 @@
       </a:defRPr>
     </a:lvl9pPr>
   </p:defaultTextStyle>
+  <p:extLst>
+    <p:ext uri="{EFAFB233-063F-42B5-8137-9DF3F51BA10A}">
+      <p15:sldGuideLst xmlns:p15="http://schemas.microsoft.com/office/powerpoint/2012/main"/>
+    </p:ext>
+  </p:extLst>
 </p:presentation>
 </file>
 
@@ -442,7 +447,7 @@
           <a:p>
             <a:fld id="{1160EA64-D806-43AC-9DF2-F8C432F32B4C}" type="datetimeFigureOut">
               <a:rPr lang="en-US" dirty="0"/>
-              <a:t>3/16/2021</a:t>
+              <a:t>3/17/2021</a:t>
             </a:fld>
             <a:endParaRPr lang="en-US" dirty="0"/>
           </a:p>
@@ -608,7 +613,7 @@
           <a:p>
             <a:fld id="{E9F9C37B-1D36-470B-8223-D6C91242EC14}" type="datetimeFigureOut">
               <a:rPr lang="en-US" dirty="0"/>
-              <a:t>3/16/2021</a:t>
+              <a:t>3/17/2021</a:t>
             </a:fld>
             <a:endParaRPr lang="en-US" dirty="0"/>
           </a:p>
@@ -783,7 +788,7 @@
           <a:p>
             <a:fld id="{67C6F52A-A82B-47A2-A83A-8C4C91F2D59F}" type="datetimeFigureOut">
               <a:rPr lang="en-US" dirty="0"/>
-              <a:t>3/16/2021</a:t>
+              <a:t>3/17/2021</a:t>
             </a:fld>
             <a:endParaRPr lang="en-US" dirty="0"/>
           </a:p>
@@ -948,7 +953,7 @@
           <a:p>
             <a:fld id="{F070A7B3-6521-4DCA-87E5-044747A908C1}" type="datetimeFigureOut">
               <a:rPr lang="en-US" dirty="0"/>
-              <a:t>3/16/2021</a:t>
+              <a:t>3/17/2021</a:t>
             </a:fld>
             <a:endParaRPr lang="en-US" dirty="0"/>
           </a:p>
@@ -1212,7 +1217,7 @@
           <a:p>
             <a:fld id="{1160EA64-D806-43AC-9DF2-F8C432F32B4C}" type="datetimeFigureOut">
               <a:rPr lang="en-US" dirty="0"/>
-              <a:t>3/16/2021</a:t>
+              <a:t>3/17/2021</a:t>
             </a:fld>
             <a:endParaRPr lang="en-US" dirty="0"/>
           </a:p>
@@ -1440,7 +1445,7 @@
           <a:p>
             <a:fld id="{AB134690-1557-4C89-A502-4959FE7FAD70}" type="datetimeFigureOut">
               <a:rPr lang="en-US" dirty="0"/>
-              <a:t>3/16/2021</a:t>
+              <a:t>3/17/2021</a:t>
             </a:fld>
             <a:endParaRPr lang="en-US" dirty="0"/>
           </a:p>
@@ -1794,7 +1799,7 @@
           <a:p>
             <a:fld id="{4F7D4976-E339-4826-83B7-FBD03F55ECF8}" type="datetimeFigureOut">
               <a:rPr lang="en-US" dirty="0"/>
-              <a:t>3/16/2021</a:t>
+              <a:t>3/17/2021</a:t>
             </a:fld>
             <a:endParaRPr lang="en-US" dirty="0"/>
           </a:p>
@@ -1930,7 +1935,7 @@
           <a:p>
             <a:fld id="{E1037C31-9E7A-4F99-8774-A0E530DE1A42}" type="datetimeFigureOut">
               <a:rPr lang="en-US" dirty="0"/>
-              <a:t>3/16/2021</a:t>
+              <a:t>3/17/2021</a:t>
             </a:fld>
             <a:endParaRPr lang="en-US" dirty="0"/>
           </a:p>
@@ -2020,7 +2025,7 @@
           <a:p>
             <a:fld id="{C278504F-A551-4DE0-9316-4DCD1D8CC752}" type="datetimeFigureOut">
               <a:rPr lang="en-US" dirty="0"/>
-              <a:t>3/16/2021</a:t>
+              <a:t>3/17/2021</a:t>
             </a:fld>
             <a:endParaRPr lang="en-US" dirty="0"/>
           </a:p>
@@ -2372,7 +2377,7 @@
           <a:p>
             <a:fld id="{D1BE4249-C0D0-4B06-8692-E8BB871AF643}" type="datetimeFigureOut">
               <a:rPr lang="en-US" dirty="0"/>
-              <a:t>3/16/2021</a:t>
+              <a:t>3/17/2021</a:t>
             </a:fld>
             <a:endParaRPr lang="en-US" dirty="0"/>
           </a:p>
@@ -2724,7 +2729,7 @@
           <a:p>
             <a:fld id="{042B0DB6-F5C7-45FB-8CF3-31B45F9C2DAC}" type="datetimeFigureOut">
               <a:rPr lang="en-US" dirty="0"/>
-              <a:t>3/16/2021</a:t>
+              <a:t>3/17/2021</a:t>
             </a:fld>
             <a:endParaRPr lang="en-US" dirty="0"/>
           </a:p>
@@ -2961,7 +2966,7 @@
           <a:p>
             <a:fld id="{1160EA64-D806-43AC-9DF2-F8C432F32B4C}" type="datetimeFigureOut">
               <a:rPr lang="en-US" dirty="0"/>
-              <a:t>3/16/2021</a:t>
+              <a:t>3/17/2021</a:t>
             </a:fld>
             <a:endParaRPr lang="en-US" dirty="0"/>
           </a:p>
@@ -4417,6 +4422,14 @@
 <file path=ppt/slides/slide7.xml><?xml version="1.0" encoding="utf-8"?>
 <p:sld xmlns:a="http://schemas.openxmlformats.org/drawingml/2006/main" xmlns:r="http://schemas.openxmlformats.org/officeDocument/2006/relationships" xmlns:p="http://schemas.openxmlformats.org/presentationml/2006/main">
   <p:cSld>
+    <p:bg>
+      <p:bgPr>
+        <a:solidFill>
+          <a:schemeClr val="bg1"/>
+        </a:solidFill>
+        <a:effectLst/>
+      </p:bgPr>
+    </p:bg>
     <p:spTree>
       <p:nvGrpSpPr>
         <p:cNvPr id="1" name=""/>
@@ -4433,6 +4446,69 @@
       </p:grpSpPr>
       <p:sp>
         <p:nvSpPr>
+          <p:cNvPr id="10" name="Rectangle 9">
+            <a:extLst>
+              <a:ext uri="{FF2B5EF4-FFF2-40B4-BE49-F238E27FC236}">
+                <a16:creationId xmlns:a16="http://schemas.microsoft.com/office/drawing/2014/main" id="{23D9B6CF-87DD-47C7-B38D-7C5353D4DC9D}"/>
+              </a:ext>
+              <a:ext uri="{C183D7F6-B498-43B3-948B-1728B52AA6E4}">
+                <adec:decorative xmlns:adec="http://schemas.microsoft.com/office/drawing/2017/decorative" val="1"/>
+              </a:ext>
+            </a:extLst>
+          </p:cNvPr>
+          <p:cNvSpPr>
+            <a:spLocks noGrp="1" noRot="1" noChangeAspect="1" noMove="1" noResize="1" noEditPoints="1" noAdjustHandles="1" noChangeArrowheads="1" noChangeShapeType="1" noTextEdit="1"/>
+          </p:cNvSpPr>
+          <p:nvPr>
+            <p:extLst>
+              <p:ext uri="{386F3935-93C4-4BCD-93E2-E3B085C9AB24}">
+                <p16:designElem xmlns:p16="http://schemas.microsoft.com/office/powerpoint/2015/main" val="1"/>
+              </p:ext>
+            </p:extLst>
+          </p:nvPr>
+        </p:nvSpPr>
+        <p:spPr>
+          <a:xfrm>
+            <a:off x="0" y="-2"/>
+            <a:ext cx="12192000" cy="6858002"/>
+          </a:xfrm>
+          <a:prstGeom prst="rect">
+            <a:avLst/>
+          </a:prstGeom>
+          <a:solidFill>
+            <a:schemeClr val="accent2"/>
+          </a:solidFill>
+          <a:ln>
+            <a:noFill/>
+          </a:ln>
+        </p:spPr>
+        <p:style>
+          <a:lnRef idx="2">
+            <a:schemeClr val="accent1">
+              <a:shade val="50000"/>
+            </a:schemeClr>
+          </a:lnRef>
+          <a:fillRef idx="1">
+            <a:schemeClr val="accent1"/>
+          </a:fillRef>
+          <a:effectRef idx="0">
+            <a:schemeClr val="accent1"/>
+          </a:effectRef>
+          <a:fontRef idx="minor">
+            <a:schemeClr val="lt1"/>
+          </a:fontRef>
+        </p:style>
+        <p:txBody>
+          <a:bodyPr rtlCol="0" anchor="ctr"/>
+          <a:lstStyle/>
+          <a:p>
+            <a:pPr algn="ctr"/>
+            <a:endParaRPr lang="en-US"/>
+          </a:p>
+        </p:txBody>
+      </p:sp>
+      <p:sp>
+        <p:nvSpPr>
           <p:cNvPr id="2" name="Title 1">
             <a:extLst>
               <a:ext uri="{FF2B5EF4-FFF2-40B4-BE49-F238E27FC236}">
@@ -4447,9 +4523,16 @@
             <p:ph type="title"/>
           </p:nvPr>
         </p:nvSpPr>
-        <p:spPr/>
-        <p:txBody>
-          <a:bodyPr/>
+        <p:spPr>
+          <a:xfrm>
+            <a:off x="804673" y="2133600"/>
+            <a:ext cx="3044952" cy="1898904"/>
+          </a:xfrm>
+        </p:spPr>
+        <p:txBody>
+          <a:bodyPr vert="horz" lIns="274320" tIns="182880" rIns="274320" bIns="182880" rtlCol="0" anchor="ctr" anchorCtr="1">
+            <a:normAutofit/>
+          </a:bodyPr>
           <a:lstStyle/>
           <a:p>
             <a:r>
@@ -4475,15 +4558,241 @@
             <p:ph idx="1"/>
           </p:nvPr>
         </p:nvSpPr>
-        <p:spPr/>
-        <p:txBody>
-          <a:bodyPr/>
-          <a:lstStyle/>
-          <a:p>
-            <a:r>
-              <a:rPr lang="en-US" dirty="0"/>
+        <p:spPr>
+          <a:xfrm>
+            <a:off x="993088" y="4352543"/>
+            <a:ext cx="2668122" cy="1387983"/>
+          </a:xfrm>
+        </p:spPr>
+        <p:txBody>
+          <a:bodyPr vert="horz" lIns="91440" tIns="45720" rIns="91440" bIns="45720" rtlCol="0">
+            <a:normAutofit/>
+          </a:bodyPr>
+          <a:lstStyle/>
+          <a:p>
+            <a:pPr marL="0" indent="0" algn="ctr">
+              <a:buNone/>
+            </a:pPr>
+            <a:r>
+              <a:rPr lang="en-US" kern="1200">
+                <a:solidFill>
+                  <a:srgbClr val="FFFFFF"/>
+                </a:solidFill>
+                <a:latin typeface="+mn-lt"/>
+                <a:ea typeface="+mn-ea"/>
+                <a:cs typeface="+mn-cs"/>
+              </a:rPr>
               <a:t>Concave part of the elbow determines the clusters needed</a:t>
             </a:r>
+          </a:p>
+        </p:txBody>
+      </p:sp>
+      <p:sp>
+        <p:nvSpPr>
+          <p:cNvPr id="12" name="Rectangle 11">
+            <a:extLst>
+              <a:ext uri="{FF2B5EF4-FFF2-40B4-BE49-F238E27FC236}">
+                <a16:creationId xmlns:a16="http://schemas.microsoft.com/office/drawing/2014/main" id="{EFE2328B-DA12-4B90-BD82-3CCF13AF6C83}"/>
+              </a:ext>
+              <a:ext uri="{C183D7F6-B498-43B3-948B-1728B52AA6E4}">
+                <adec:decorative xmlns:adec="http://schemas.microsoft.com/office/drawing/2017/decorative" val="1"/>
+              </a:ext>
+            </a:extLst>
+          </p:cNvPr>
+          <p:cNvSpPr>
+            <a:spLocks noGrp="1" noRot="1" noChangeAspect="1" noMove="1" noResize="1" noEditPoints="1" noAdjustHandles="1" noChangeArrowheads="1" noChangeShapeType="1" noTextEdit="1"/>
+          </p:cNvSpPr>
+          <p:nvPr>
+            <p:extLst>
+              <p:ext uri="{386F3935-93C4-4BCD-93E2-E3B085C9AB24}">
+                <p16:designElem xmlns:p16="http://schemas.microsoft.com/office/powerpoint/2015/main" val="1"/>
+              </p:ext>
+            </p:extLst>
+          </p:nvPr>
+        </p:nvSpPr>
+        <p:spPr>
+          <a:xfrm>
+            <a:off x="4654296" y="640080"/>
+            <a:ext cx="6897625" cy="5263134"/>
+          </a:xfrm>
+          <a:prstGeom prst="rect">
+            <a:avLst/>
+          </a:prstGeom>
+          <a:noFill/>
+          <a:ln w="31750" cap="sq">
+            <a:solidFill>
+              <a:srgbClr val="FFFFFF"/>
+            </a:solidFill>
+            <a:miter lim="800000"/>
+          </a:ln>
+        </p:spPr>
+        <p:style>
+          <a:lnRef idx="2">
+            <a:schemeClr val="accent1">
+              <a:shade val="50000"/>
+            </a:schemeClr>
+          </a:lnRef>
+          <a:fillRef idx="1">
+            <a:schemeClr val="accent1"/>
+          </a:fillRef>
+          <a:effectRef idx="0">
+            <a:schemeClr val="accent1"/>
+          </a:effectRef>
+          <a:fontRef idx="minor">
+            <a:schemeClr val="lt1"/>
+          </a:fontRef>
+        </p:style>
+        <p:txBody>
+          <a:bodyPr rtlCol="0" anchor="ctr"/>
+          <a:lstStyle/>
+          <a:p>
+            <a:pPr algn="ctr"/>
+            <a:endParaRPr lang="en-US" dirty="0"/>
+          </a:p>
+        </p:txBody>
+      </p:sp>
+      <p:sp>
+        <p:nvSpPr>
+          <p:cNvPr id="14" name="Rectangle 13">
+            <a:extLst>
+              <a:ext uri="{FF2B5EF4-FFF2-40B4-BE49-F238E27FC236}">
+                <a16:creationId xmlns:a16="http://schemas.microsoft.com/office/drawing/2014/main" id="{F77FF0B6-332F-4842-A5F8-EA360BD5FF84}"/>
+              </a:ext>
+              <a:ext uri="{C183D7F6-B498-43B3-948B-1728B52AA6E4}">
+                <adec:decorative xmlns:adec="http://schemas.microsoft.com/office/drawing/2017/decorative" val="1"/>
+              </a:ext>
+            </a:extLst>
+          </p:cNvPr>
+          <p:cNvSpPr>
+            <a:spLocks noGrp="1" noRot="1" noChangeAspect="1" noMove="1" noResize="1" noEditPoints="1" noAdjustHandles="1" noChangeArrowheads="1" noChangeShapeType="1" noTextEdit="1"/>
+          </p:cNvSpPr>
+          <p:nvPr>
+            <p:extLst>
+              <p:ext uri="{386F3935-93C4-4BCD-93E2-E3B085C9AB24}">
+                <p16:designElem xmlns:p16="http://schemas.microsoft.com/office/powerpoint/2015/main" val="1"/>
+              </p:ext>
+            </p:extLst>
+          </p:nvPr>
+        </p:nvSpPr>
+        <p:spPr>
+          <a:xfrm>
+            <a:off x="4820412" y="802767"/>
+            <a:ext cx="6565392" cy="4937760"/>
+          </a:xfrm>
+          <a:prstGeom prst="rect">
+            <a:avLst/>
+          </a:prstGeom>
+          <a:solidFill>
+            <a:schemeClr val="bg1"/>
+          </a:solidFill>
+          <a:ln>
+            <a:noFill/>
+          </a:ln>
+        </p:spPr>
+        <p:style>
+          <a:lnRef idx="2">
+            <a:schemeClr val="accent1">
+              <a:shade val="50000"/>
+            </a:schemeClr>
+          </a:lnRef>
+          <a:fillRef idx="1">
+            <a:schemeClr val="accent1"/>
+          </a:fillRef>
+          <a:effectRef idx="0">
+            <a:schemeClr val="accent1"/>
+          </a:effectRef>
+          <a:fontRef idx="minor">
+            <a:schemeClr val="lt1"/>
+          </a:fontRef>
+        </p:style>
+        <p:txBody>
+          <a:bodyPr rtlCol="0" anchor="ctr"/>
+          <a:lstStyle/>
+          <a:p>
+            <a:pPr algn="ctr"/>
+            <a:endParaRPr lang="en-US"/>
+          </a:p>
+        </p:txBody>
+      </p:sp>
+      <p:pic>
+        <p:nvPicPr>
+          <p:cNvPr id="5" name="Picture 4" descr="Chart, line chart&#10;&#10;Description automatically generated">
+            <a:extLst>
+              <a:ext uri="{FF2B5EF4-FFF2-40B4-BE49-F238E27FC236}">
+                <a16:creationId xmlns:a16="http://schemas.microsoft.com/office/drawing/2014/main" id="{245B6F67-AE75-45B3-B804-474B366D4766}"/>
+              </a:ext>
+            </a:extLst>
+          </p:cNvPr>
+          <p:cNvPicPr>
+            <a:picLocks noChangeAspect="1"/>
+          </p:cNvPicPr>
+          <p:nvPr/>
+        </p:nvPicPr>
+        <p:blipFill>
+          <a:blip r:embed="rId2"/>
+          <a:stretch>
+            <a:fillRect/>
+          </a:stretch>
+        </p:blipFill>
+        <p:spPr>
+          <a:xfrm>
+            <a:off x="4826941" y="1753285"/>
+            <a:ext cx="6544959" cy="3354291"/>
+          </a:xfrm>
+          <a:prstGeom prst="rect">
+            <a:avLst/>
+          </a:prstGeom>
+        </p:spPr>
+      </p:pic>
+      <p:sp>
+        <p:nvSpPr>
+          <p:cNvPr id="6" name="Oval 5">
+            <a:extLst>
+              <a:ext uri="{FF2B5EF4-FFF2-40B4-BE49-F238E27FC236}">
+                <a16:creationId xmlns:a16="http://schemas.microsoft.com/office/drawing/2014/main" id="{DD970ABF-F750-4D2A-B499-1D154A3C8EEE}"/>
+              </a:ext>
+            </a:extLst>
+          </p:cNvPr>
+          <p:cNvSpPr/>
+          <p:nvPr/>
+        </p:nvSpPr>
+        <p:spPr>
+          <a:xfrm>
+            <a:off x="5897335" y="3343274"/>
+            <a:ext cx="330654" cy="304383"/>
+          </a:xfrm>
+          <a:prstGeom prst="ellipse">
+            <a:avLst/>
+          </a:prstGeom>
+          <a:noFill/>
+          <a:ln>
+            <a:solidFill>
+              <a:srgbClr val="FF0000"/>
+            </a:solidFill>
+          </a:ln>
+        </p:spPr>
+        <p:style>
+          <a:lnRef idx="2">
+            <a:schemeClr val="accent1">
+              <a:shade val="50000"/>
+            </a:schemeClr>
+          </a:lnRef>
+          <a:fillRef idx="1">
+            <a:schemeClr val="accent1"/>
+          </a:fillRef>
+          <a:effectRef idx="0">
+            <a:schemeClr val="accent1"/>
+          </a:effectRef>
+          <a:fontRef idx="minor">
+            <a:schemeClr val="lt1"/>
+          </a:fontRef>
+        </p:style>
+        <p:txBody>
+          <a:bodyPr rtlCol="0" anchor="ctr"/>
+          <a:lstStyle/>
+          <a:p>
+            <a:pPr algn="ctr"/>
+            <a:endParaRPr lang="en-US"/>
           </a:p>
         </p:txBody>
       </p:sp>
@@ -4503,6 +4812,14 @@
 <file path=ppt/slides/slide8.xml><?xml version="1.0" encoding="utf-8"?>
 <p:sld xmlns:a="http://schemas.openxmlformats.org/drawingml/2006/main" xmlns:r="http://schemas.openxmlformats.org/officeDocument/2006/relationships" xmlns:p="http://schemas.openxmlformats.org/presentationml/2006/main">
   <p:cSld>
+    <p:bg>
+      <p:bgPr>
+        <a:solidFill>
+          <a:schemeClr val="bg1"/>
+        </a:solidFill>
+        <a:effectLst/>
+      </p:bgPr>
+    </p:bg>
     <p:spTree>
       <p:nvGrpSpPr>
         <p:cNvPr id="1" name=""/>
@@ -4533,15 +4850,85 @@
             <p:ph type="title"/>
           </p:nvPr>
         </p:nvSpPr>
-        <p:spPr/>
-        <p:txBody>
-          <a:bodyPr/>
-          <a:lstStyle/>
-          <a:p>
-            <a:r>
-              <a:rPr lang="en-US" dirty="0"/>
+        <p:spPr>
+          <a:xfrm>
+            <a:off x="640079" y="2057847"/>
+            <a:ext cx="2968689" cy="949452"/>
+          </a:xfrm>
+        </p:spPr>
+        <p:txBody>
+          <a:bodyPr vert="horz" lIns="274320" tIns="182880" rIns="274320" bIns="182880" rtlCol="0" anchor="ctr" anchorCtr="1">
+            <a:normAutofit fontScale="90000"/>
+          </a:bodyPr>
+          <a:lstStyle/>
+          <a:p>
+            <a:r>
+              <a:rPr lang="en-US" sz="2400" dirty="0"/>
               <a:t>Parallel Coordinates</a:t>
             </a:r>
+          </a:p>
+        </p:txBody>
+      </p:sp>
+      <p:sp>
+        <p:nvSpPr>
+          <p:cNvPr id="19" name="Rectangle 18">
+            <a:extLst>
+              <a:ext uri="{FF2B5EF4-FFF2-40B4-BE49-F238E27FC236}">
+                <a16:creationId xmlns:a16="http://schemas.microsoft.com/office/drawing/2014/main" id="{23D9B6CF-87DD-47C7-B38D-7C5353D4DC9D}"/>
+              </a:ext>
+              <a:ext uri="{C183D7F6-B498-43B3-948B-1728B52AA6E4}">
+                <adec:decorative xmlns:adec="http://schemas.microsoft.com/office/drawing/2017/decorative" val="1"/>
+              </a:ext>
+            </a:extLst>
+          </p:cNvPr>
+          <p:cNvSpPr>
+            <a:spLocks noGrp="1" noRot="1" noChangeAspect="1" noMove="1" noResize="1" noEditPoints="1" noAdjustHandles="1" noChangeArrowheads="1" noChangeShapeType="1" noTextEdit="1"/>
+          </p:cNvSpPr>
+          <p:nvPr>
+            <p:extLst>
+              <p:ext uri="{386F3935-93C4-4BCD-93E2-E3B085C9AB24}">
+                <p16:designElem xmlns:p16="http://schemas.microsoft.com/office/powerpoint/2015/main" val="1"/>
+              </p:ext>
+            </p:extLst>
+          </p:nvPr>
+        </p:nvSpPr>
+        <p:spPr>
+          <a:xfrm>
+            <a:off x="0" y="-2"/>
+            <a:ext cx="12192000" cy="6858002"/>
+          </a:xfrm>
+          <a:prstGeom prst="rect">
+            <a:avLst/>
+          </a:prstGeom>
+          <a:solidFill>
+            <a:schemeClr val="accent2"/>
+          </a:solidFill>
+          <a:ln>
+            <a:noFill/>
+          </a:ln>
+        </p:spPr>
+        <p:style>
+          <a:lnRef idx="2">
+            <a:schemeClr val="accent1">
+              <a:shade val="50000"/>
+            </a:schemeClr>
+          </a:lnRef>
+          <a:fillRef idx="1">
+            <a:schemeClr val="accent1"/>
+          </a:fillRef>
+          <a:effectRef idx="0">
+            <a:schemeClr val="accent1"/>
+          </a:effectRef>
+          <a:fontRef idx="minor">
+            <a:schemeClr val="lt1"/>
+          </a:fontRef>
+        </p:style>
+        <p:txBody>
+          <a:bodyPr rtlCol="0" anchor="ctr"/>
+          <a:lstStyle/>
+          <a:p>
+            <a:pPr algn="ctr"/>
+            <a:endParaRPr lang="en-US"/>
           </a:p>
         </p:txBody>
       </p:sp>
@@ -4561,18 +4948,192 @@
             <p:ph idx="1"/>
           </p:nvPr>
         </p:nvSpPr>
-        <p:spPr/>
-        <p:txBody>
-          <a:bodyPr/>
-          <a:lstStyle/>
-          <a:p>
-            <a:r>
-              <a:rPr lang="en-US" dirty="0"/>
+        <p:spPr>
+          <a:xfrm>
+            <a:off x="197560" y="2160613"/>
+            <a:ext cx="2668122" cy="1387983"/>
+          </a:xfrm>
+        </p:spPr>
+        <p:txBody>
+          <a:bodyPr vert="horz" lIns="91440" tIns="45720" rIns="91440" bIns="45720" rtlCol="0">
+            <a:normAutofit/>
+          </a:bodyPr>
+          <a:lstStyle/>
+          <a:p>
+            <a:pPr marL="0" indent="0" algn="ctr">
+              <a:buNone/>
+            </a:pPr>
+            <a:r>
+              <a:rPr lang="en-US" kern="1200" dirty="0">
+                <a:solidFill>
+                  <a:srgbClr val="FFFFFF"/>
+                </a:solidFill>
+                <a:latin typeface="+mn-lt"/>
+                <a:ea typeface="+mn-ea"/>
+                <a:cs typeface="+mn-cs"/>
+              </a:rPr>
               <a:t>Maps the centroid of each cluster</a:t>
             </a:r>
           </a:p>
         </p:txBody>
       </p:sp>
+      <p:sp>
+        <p:nvSpPr>
+          <p:cNvPr id="21" name="Rectangle 20">
+            <a:extLst>
+              <a:ext uri="{FF2B5EF4-FFF2-40B4-BE49-F238E27FC236}">
+                <a16:creationId xmlns:a16="http://schemas.microsoft.com/office/drawing/2014/main" id="{EFE2328B-DA12-4B90-BD82-3CCF13AF6C83}"/>
+              </a:ext>
+              <a:ext uri="{C183D7F6-B498-43B3-948B-1728B52AA6E4}">
+                <adec:decorative xmlns:adec="http://schemas.microsoft.com/office/drawing/2017/decorative" val="1"/>
+              </a:ext>
+            </a:extLst>
+          </p:cNvPr>
+          <p:cNvSpPr>
+            <a:spLocks noGrp="1" noRot="1" noChangeAspect="1" noMove="1" noResize="1" noEditPoints="1" noAdjustHandles="1" noChangeArrowheads="1" noChangeShapeType="1" noTextEdit="1"/>
+          </p:cNvSpPr>
+          <p:nvPr>
+            <p:extLst>
+              <p:ext uri="{386F3935-93C4-4BCD-93E2-E3B085C9AB24}">
+                <p16:designElem xmlns:p16="http://schemas.microsoft.com/office/powerpoint/2015/main" val="1"/>
+              </p:ext>
+            </p:extLst>
+          </p:nvPr>
+        </p:nvSpPr>
+        <p:spPr>
+          <a:xfrm>
+            <a:off x="4654296" y="640080"/>
+            <a:ext cx="6897625" cy="5263134"/>
+          </a:xfrm>
+          <a:prstGeom prst="rect">
+            <a:avLst/>
+          </a:prstGeom>
+          <a:noFill/>
+          <a:ln w="31750" cap="sq">
+            <a:solidFill>
+              <a:srgbClr val="FFFFFF"/>
+            </a:solidFill>
+            <a:miter lim="800000"/>
+          </a:ln>
+        </p:spPr>
+        <p:style>
+          <a:lnRef idx="2">
+            <a:schemeClr val="accent1">
+              <a:shade val="50000"/>
+            </a:schemeClr>
+          </a:lnRef>
+          <a:fillRef idx="1">
+            <a:schemeClr val="accent1"/>
+          </a:fillRef>
+          <a:effectRef idx="0">
+            <a:schemeClr val="accent1"/>
+          </a:effectRef>
+          <a:fontRef idx="minor">
+            <a:schemeClr val="lt1"/>
+          </a:fontRef>
+        </p:style>
+        <p:txBody>
+          <a:bodyPr rtlCol="0" anchor="ctr"/>
+          <a:lstStyle/>
+          <a:p>
+            <a:pPr algn="ctr"/>
+            <a:endParaRPr lang="en-US" dirty="0"/>
+          </a:p>
+        </p:txBody>
+      </p:sp>
+      <p:sp>
+        <p:nvSpPr>
+          <p:cNvPr id="26" name="Rectangle 22">
+            <a:extLst>
+              <a:ext uri="{FF2B5EF4-FFF2-40B4-BE49-F238E27FC236}">
+                <a16:creationId xmlns:a16="http://schemas.microsoft.com/office/drawing/2014/main" id="{F77FF0B6-332F-4842-A5F8-EA360BD5FF84}"/>
+              </a:ext>
+              <a:ext uri="{C183D7F6-B498-43B3-948B-1728B52AA6E4}">
+                <adec:decorative xmlns:adec="http://schemas.microsoft.com/office/drawing/2017/decorative" val="1"/>
+              </a:ext>
+            </a:extLst>
+          </p:cNvPr>
+          <p:cNvSpPr>
+            <a:spLocks noGrp="1" noRot="1" noChangeAspect="1" noMove="1" noResize="1" noEditPoints="1" noAdjustHandles="1" noChangeArrowheads="1" noChangeShapeType="1" noTextEdit="1"/>
+          </p:cNvSpPr>
+          <p:nvPr>
+            <p:extLst>
+              <p:ext uri="{386F3935-93C4-4BCD-93E2-E3B085C9AB24}">
+                <p16:designElem xmlns:p16="http://schemas.microsoft.com/office/powerpoint/2015/main" val="1"/>
+              </p:ext>
+            </p:extLst>
+          </p:nvPr>
+        </p:nvSpPr>
+        <p:spPr>
+          <a:xfrm>
+            <a:off x="4820412" y="802767"/>
+            <a:ext cx="6565392" cy="4937760"/>
+          </a:xfrm>
+          <a:prstGeom prst="rect">
+            <a:avLst/>
+          </a:prstGeom>
+          <a:solidFill>
+            <a:schemeClr val="bg1"/>
+          </a:solidFill>
+          <a:ln>
+            <a:noFill/>
+          </a:ln>
+        </p:spPr>
+        <p:style>
+          <a:lnRef idx="2">
+            <a:schemeClr val="accent1">
+              <a:shade val="50000"/>
+            </a:schemeClr>
+          </a:lnRef>
+          <a:fillRef idx="1">
+            <a:schemeClr val="accent1"/>
+          </a:fillRef>
+          <a:effectRef idx="0">
+            <a:schemeClr val="accent1"/>
+          </a:effectRef>
+          <a:fontRef idx="minor">
+            <a:schemeClr val="lt1"/>
+          </a:fontRef>
+        </p:style>
+        <p:txBody>
+          <a:bodyPr rtlCol="0" anchor="ctr"/>
+          <a:lstStyle/>
+          <a:p>
+            <a:pPr algn="ctr"/>
+            <a:endParaRPr lang="en-US"/>
+          </a:p>
+        </p:txBody>
+      </p:sp>
+      <p:pic>
+        <p:nvPicPr>
+          <p:cNvPr id="5" name="Picture 4" descr="Chart&#10;&#10;Description automatically generated">
+            <a:extLst>
+              <a:ext uri="{FF2B5EF4-FFF2-40B4-BE49-F238E27FC236}">
+                <a16:creationId xmlns:a16="http://schemas.microsoft.com/office/drawing/2014/main" id="{66EA1652-E9C9-44C3-987E-4311C22DEA60}"/>
+              </a:ext>
+            </a:extLst>
+          </p:cNvPr>
+          <p:cNvPicPr>
+            <a:picLocks noChangeAspect="1"/>
+          </p:cNvPicPr>
+          <p:nvPr/>
+        </p:nvPicPr>
+        <p:blipFill>
+          <a:blip r:embed="rId2"/>
+          <a:stretch>
+            <a:fillRect/>
+          </a:stretch>
+        </p:blipFill>
+        <p:spPr>
+          <a:xfrm>
+            <a:off x="197560" y="184378"/>
+            <a:ext cx="11786294" cy="6570856"/>
+          </a:xfrm>
+          <a:prstGeom prst="rect">
+            <a:avLst/>
+          </a:prstGeom>
+        </p:spPr>
+      </p:pic>
     </p:spTree>
     <p:extLst>
       <p:ext uri="{BB962C8B-B14F-4D97-AF65-F5344CB8AC3E}">

</xml_diff>

<commit_message>
added images to elbow & parallel coord slides
</commit_message>
<xml_diff>
--- a/Final Project.pptx
+++ b/Final Project.pptx
@@ -369,7 +369,7 @@
           <a:p>
             <a:fld id="{0406F20A-6DCB-4E49-8B9A-BCACB2DB4D88}" type="datetimeFigureOut">
               <a:rPr lang="en-US" smtClean="0"/>
-              <a:t>3/17/21</a:t>
+              <a:t>3/17/2021</a:t>
             </a:fld>
             <a:endParaRPr lang="en-US"/>
           </a:p>
@@ -903,7 +903,7 @@
           <a:p>
             <a:fld id="{1160EA64-D806-43AC-9DF2-F8C432F32B4C}" type="datetimeFigureOut">
               <a:rPr lang="en-US" dirty="0"/>
-              <a:t>3/17/21</a:t>
+              <a:t>3/17/2021</a:t>
             </a:fld>
             <a:endParaRPr lang="en-US" dirty="0"/>
           </a:p>
@@ -1069,7 +1069,7 @@
           <a:p>
             <a:fld id="{E9F9C37B-1D36-470B-8223-D6C91242EC14}" type="datetimeFigureOut">
               <a:rPr lang="en-US" dirty="0"/>
-              <a:t>3/17/21</a:t>
+              <a:t>3/17/2021</a:t>
             </a:fld>
             <a:endParaRPr lang="en-US" dirty="0"/>
           </a:p>
@@ -1244,7 +1244,7 @@
           <a:p>
             <a:fld id="{67C6F52A-A82B-47A2-A83A-8C4C91F2D59F}" type="datetimeFigureOut">
               <a:rPr lang="en-US" dirty="0"/>
-              <a:t>3/17/21</a:t>
+              <a:t>3/17/2021</a:t>
             </a:fld>
             <a:endParaRPr lang="en-US" dirty="0"/>
           </a:p>
@@ -1409,7 +1409,7 @@
           <a:p>
             <a:fld id="{F070A7B3-6521-4DCA-87E5-044747A908C1}" type="datetimeFigureOut">
               <a:rPr lang="en-US" dirty="0"/>
-              <a:t>3/17/21</a:t>
+              <a:t>3/17/2021</a:t>
             </a:fld>
             <a:endParaRPr lang="en-US" dirty="0"/>
           </a:p>
@@ -1673,7 +1673,7 @@
           <a:p>
             <a:fld id="{1160EA64-D806-43AC-9DF2-F8C432F32B4C}" type="datetimeFigureOut">
               <a:rPr lang="en-US" dirty="0"/>
-              <a:t>3/17/21</a:t>
+              <a:t>3/17/2021</a:t>
             </a:fld>
             <a:endParaRPr lang="en-US" dirty="0"/>
           </a:p>
@@ -1901,7 +1901,7 @@
           <a:p>
             <a:fld id="{AB134690-1557-4C89-A502-4959FE7FAD70}" type="datetimeFigureOut">
               <a:rPr lang="en-US" dirty="0"/>
-              <a:t>3/17/21</a:t>
+              <a:t>3/17/2021</a:t>
             </a:fld>
             <a:endParaRPr lang="en-US" dirty="0"/>
           </a:p>
@@ -2255,7 +2255,7 @@
           <a:p>
             <a:fld id="{4F7D4976-E339-4826-83B7-FBD03F55ECF8}" type="datetimeFigureOut">
               <a:rPr lang="en-US" dirty="0"/>
-              <a:t>3/17/21</a:t>
+              <a:t>3/17/2021</a:t>
             </a:fld>
             <a:endParaRPr lang="en-US" dirty="0"/>
           </a:p>
@@ -2391,7 +2391,7 @@
           <a:p>
             <a:fld id="{E1037C31-9E7A-4F99-8774-A0E530DE1A42}" type="datetimeFigureOut">
               <a:rPr lang="en-US" dirty="0"/>
-              <a:t>3/17/21</a:t>
+              <a:t>3/17/2021</a:t>
             </a:fld>
             <a:endParaRPr lang="en-US" dirty="0"/>
           </a:p>
@@ -2481,7 +2481,7 @@
           <a:p>
             <a:fld id="{C278504F-A551-4DE0-9316-4DCD1D8CC752}" type="datetimeFigureOut">
               <a:rPr lang="en-US" dirty="0"/>
-              <a:t>3/17/21</a:t>
+              <a:t>3/17/2021</a:t>
             </a:fld>
             <a:endParaRPr lang="en-US" dirty="0"/>
           </a:p>
@@ -2833,7 +2833,7 @@
           <a:p>
             <a:fld id="{D1BE4249-C0D0-4B06-8692-E8BB871AF643}" type="datetimeFigureOut">
               <a:rPr lang="en-US" dirty="0"/>
-              <a:t>3/17/21</a:t>
+              <a:t>3/17/2021</a:t>
             </a:fld>
             <a:endParaRPr lang="en-US" dirty="0"/>
           </a:p>
@@ -3185,7 +3185,7 @@
           <a:p>
             <a:fld id="{042B0DB6-F5C7-45FB-8CF3-31B45F9C2DAC}" type="datetimeFigureOut">
               <a:rPr lang="en-US" dirty="0"/>
-              <a:t>3/17/21</a:t>
+              <a:t>3/17/2021</a:t>
             </a:fld>
             <a:endParaRPr lang="en-US" dirty="0"/>
           </a:p>
@@ -3422,7 +3422,7 @@
           <a:p>
             <a:fld id="{1160EA64-D806-43AC-9DF2-F8C432F32B4C}" type="datetimeFigureOut">
               <a:rPr lang="en-US" dirty="0"/>
-              <a:t>3/17/21</a:t>
+              <a:t>3/17/2021</a:t>
             </a:fld>
             <a:endParaRPr lang="en-US" dirty="0"/>
           </a:p>
@@ -4878,6 +4878,14 @@
 <file path=ppt/slides/slide7.xml><?xml version="1.0" encoding="utf-8"?>
 <p:sld xmlns:a="http://schemas.openxmlformats.org/drawingml/2006/main" xmlns:r="http://schemas.openxmlformats.org/officeDocument/2006/relationships" xmlns:p="http://schemas.openxmlformats.org/presentationml/2006/main">
   <p:cSld>
+    <p:bg>
+      <p:bgPr>
+        <a:solidFill>
+          <a:schemeClr val="bg1"/>
+        </a:solidFill>
+        <a:effectLst/>
+      </p:bgPr>
+    </p:bg>
     <p:spTree>
       <p:nvGrpSpPr>
         <p:cNvPr id="1" name=""/>
@@ -4894,6 +4902,69 @@
       </p:grpSpPr>
       <p:sp>
         <p:nvSpPr>
+          <p:cNvPr id="15" name="Rectangle 9">
+            <a:extLst>
+              <a:ext uri="{FF2B5EF4-FFF2-40B4-BE49-F238E27FC236}">
+                <a16:creationId xmlns:a16="http://schemas.microsoft.com/office/drawing/2014/main" id="{23D9B6CF-87DD-47C7-B38D-7C5353D4DC9D}"/>
+              </a:ext>
+              <a:ext uri="{C183D7F6-B498-43B3-948B-1728B52AA6E4}">
+                <adec:decorative xmlns:adec="http://schemas.microsoft.com/office/drawing/2017/decorative" val="1"/>
+              </a:ext>
+            </a:extLst>
+          </p:cNvPr>
+          <p:cNvSpPr>
+            <a:spLocks noGrp="1" noRot="1" noChangeAspect="1" noMove="1" noResize="1" noEditPoints="1" noAdjustHandles="1" noChangeArrowheads="1" noChangeShapeType="1" noTextEdit="1"/>
+          </p:cNvSpPr>
+          <p:nvPr>
+            <p:extLst>
+              <p:ext uri="{386F3935-93C4-4BCD-93E2-E3B085C9AB24}">
+                <p16:designElem xmlns:p16="http://schemas.microsoft.com/office/powerpoint/2015/main" val="1"/>
+              </p:ext>
+            </p:extLst>
+          </p:nvPr>
+        </p:nvSpPr>
+        <p:spPr>
+          <a:xfrm>
+            <a:off x="0" y="-2"/>
+            <a:ext cx="12192000" cy="6858002"/>
+          </a:xfrm>
+          <a:prstGeom prst="rect">
+            <a:avLst/>
+          </a:prstGeom>
+          <a:solidFill>
+            <a:schemeClr val="accent2"/>
+          </a:solidFill>
+          <a:ln>
+            <a:noFill/>
+          </a:ln>
+        </p:spPr>
+        <p:style>
+          <a:lnRef idx="2">
+            <a:schemeClr val="accent1">
+              <a:shade val="50000"/>
+            </a:schemeClr>
+          </a:lnRef>
+          <a:fillRef idx="1">
+            <a:schemeClr val="accent1"/>
+          </a:fillRef>
+          <a:effectRef idx="0">
+            <a:schemeClr val="accent1"/>
+          </a:effectRef>
+          <a:fontRef idx="minor">
+            <a:schemeClr val="lt1"/>
+          </a:fontRef>
+        </p:style>
+        <p:txBody>
+          <a:bodyPr rtlCol="0" anchor="ctr"/>
+          <a:lstStyle/>
+          <a:p>
+            <a:pPr algn="ctr"/>
+            <a:endParaRPr lang="en-US"/>
+          </a:p>
+        </p:txBody>
+      </p:sp>
+      <p:sp>
+        <p:nvSpPr>
           <p:cNvPr id="2" name="Title 1">
             <a:extLst>
               <a:ext uri="{FF2B5EF4-FFF2-40B4-BE49-F238E27FC236}">
@@ -4908,9 +4979,16 @@
             <p:ph type="title"/>
           </p:nvPr>
         </p:nvSpPr>
-        <p:spPr/>
-        <p:txBody>
-          <a:bodyPr/>
+        <p:spPr>
+          <a:xfrm>
+            <a:off x="804673" y="2133600"/>
+            <a:ext cx="3044952" cy="1898904"/>
+          </a:xfrm>
+        </p:spPr>
+        <p:txBody>
+          <a:bodyPr vert="horz" lIns="274320" tIns="182880" rIns="274320" bIns="182880" rtlCol="0" anchor="ctr" anchorCtr="1">
+            <a:normAutofit/>
+          </a:bodyPr>
           <a:lstStyle/>
           <a:p>
             <a:r>
@@ -4936,15 +5014,243 @@
             <p:ph idx="1"/>
           </p:nvPr>
         </p:nvSpPr>
-        <p:spPr/>
-        <p:txBody>
-          <a:bodyPr/>
-          <a:lstStyle/>
-          <a:p>
-            <a:r>
-              <a:rPr lang="en-US" dirty="0"/>
+        <p:spPr>
+          <a:xfrm>
+            <a:off x="993088" y="4352543"/>
+            <a:ext cx="2668122" cy="1387983"/>
+          </a:xfrm>
+        </p:spPr>
+        <p:txBody>
+          <a:bodyPr vert="horz" lIns="91440" tIns="45720" rIns="91440" bIns="45720" rtlCol="0">
+            <a:normAutofit/>
+          </a:bodyPr>
+          <a:lstStyle/>
+          <a:p>
+            <a:pPr marL="0" indent="0" algn="ctr">
+              <a:buNone/>
+            </a:pPr>
+            <a:r>
+              <a:rPr lang="en-US" kern="1200" dirty="0">
+                <a:solidFill>
+                  <a:srgbClr val="FFFFFF"/>
+                </a:solidFill>
+                <a:latin typeface="+mn-lt"/>
+                <a:ea typeface="+mn-ea"/>
+                <a:cs typeface="+mn-cs"/>
+              </a:rPr>
               <a:t>Concave part of the elbow determines the clusters needed</a:t>
             </a:r>
+          </a:p>
+        </p:txBody>
+      </p:sp>
+      <p:sp>
+        <p:nvSpPr>
+          <p:cNvPr id="16" name="Rectangle 11">
+            <a:extLst>
+              <a:ext uri="{FF2B5EF4-FFF2-40B4-BE49-F238E27FC236}">
+                <a16:creationId xmlns:a16="http://schemas.microsoft.com/office/drawing/2014/main" id="{EFE2328B-DA12-4B90-BD82-3CCF13AF6C83}"/>
+              </a:ext>
+              <a:ext uri="{C183D7F6-B498-43B3-948B-1728B52AA6E4}">
+                <adec:decorative xmlns:adec="http://schemas.microsoft.com/office/drawing/2017/decorative" val="1"/>
+              </a:ext>
+            </a:extLst>
+          </p:cNvPr>
+          <p:cNvSpPr>
+            <a:spLocks noGrp="1" noRot="1" noChangeAspect="1" noMove="1" noResize="1" noEditPoints="1" noAdjustHandles="1" noChangeArrowheads="1" noChangeShapeType="1" noTextEdit="1"/>
+          </p:cNvSpPr>
+          <p:nvPr>
+            <p:extLst>
+              <p:ext uri="{386F3935-93C4-4BCD-93E2-E3B085C9AB24}">
+                <p16:designElem xmlns:p16="http://schemas.microsoft.com/office/powerpoint/2015/main" val="1"/>
+              </p:ext>
+            </p:extLst>
+          </p:nvPr>
+        </p:nvSpPr>
+        <p:spPr>
+          <a:xfrm>
+            <a:off x="4654296" y="640080"/>
+            <a:ext cx="6897625" cy="5263134"/>
+          </a:xfrm>
+          <a:prstGeom prst="rect">
+            <a:avLst/>
+          </a:prstGeom>
+          <a:noFill/>
+          <a:ln w="31750" cap="sq">
+            <a:solidFill>
+              <a:srgbClr val="FFFFFF"/>
+            </a:solidFill>
+            <a:miter lim="800000"/>
+          </a:ln>
+        </p:spPr>
+        <p:style>
+          <a:lnRef idx="2">
+            <a:schemeClr val="accent1">
+              <a:shade val="50000"/>
+            </a:schemeClr>
+          </a:lnRef>
+          <a:fillRef idx="1">
+            <a:schemeClr val="accent1"/>
+          </a:fillRef>
+          <a:effectRef idx="0">
+            <a:schemeClr val="accent1"/>
+          </a:effectRef>
+          <a:fontRef idx="minor">
+            <a:schemeClr val="lt1"/>
+          </a:fontRef>
+        </p:style>
+        <p:txBody>
+          <a:bodyPr rtlCol="0" anchor="ctr"/>
+          <a:lstStyle/>
+          <a:p>
+            <a:pPr algn="ctr"/>
+            <a:endParaRPr lang="en-US" dirty="0"/>
+          </a:p>
+        </p:txBody>
+      </p:sp>
+      <p:sp>
+        <p:nvSpPr>
+          <p:cNvPr id="14" name="Rectangle 13">
+            <a:extLst>
+              <a:ext uri="{FF2B5EF4-FFF2-40B4-BE49-F238E27FC236}">
+                <a16:creationId xmlns:a16="http://schemas.microsoft.com/office/drawing/2014/main" id="{F77FF0B6-332F-4842-A5F8-EA360BD5FF84}"/>
+              </a:ext>
+              <a:ext uri="{C183D7F6-B498-43B3-948B-1728B52AA6E4}">
+                <adec:decorative xmlns:adec="http://schemas.microsoft.com/office/drawing/2017/decorative" val="1"/>
+              </a:ext>
+            </a:extLst>
+          </p:cNvPr>
+          <p:cNvSpPr>
+            <a:spLocks noGrp="1" noRot="1" noChangeAspect="1" noMove="1" noResize="1" noEditPoints="1" noAdjustHandles="1" noChangeArrowheads="1" noChangeShapeType="1" noTextEdit="1"/>
+          </p:cNvSpPr>
+          <p:nvPr>
+            <p:extLst>
+              <p:ext uri="{386F3935-93C4-4BCD-93E2-E3B085C9AB24}">
+                <p16:designElem xmlns:p16="http://schemas.microsoft.com/office/powerpoint/2015/main" val="1"/>
+              </p:ext>
+            </p:extLst>
+          </p:nvPr>
+        </p:nvSpPr>
+        <p:spPr>
+          <a:xfrm>
+            <a:off x="4820412" y="802767"/>
+            <a:ext cx="6565392" cy="4937760"/>
+          </a:xfrm>
+          <a:prstGeom prst="rect">
+            <a:avLst/>
+          </a:prstGeom>
+          <a:solidFill>
+            <a:schemeClr val="bg1"/>
+          </a:solidFill>
+          <a:ln>
+            <a:noFill/>
+          </a:ln>
+        </p:spPr>
+        <p:style>
+          <a:lnRef idx="2">
+            <a:schemeClr val="accent1">
+              <a:shade val="50000"/>
+            </a:schemeClr>
+          </a:lnRef>
+          <a:fillRef idx="1">
+            <a:schemeClr val="accent1"/>
+          </a:fillRef>
+          <a:effectRef idx="0">
+            <a:schemeClr val="accent1"/>
+          </a:effectRef>
+          <a:fontRef idx="minor">
+            <a:schemeClr val="lt1"/>
+          </a:fontRef>
+        </p:style>
+        <p:txBody>
+          <a:bodyPr rtlCol="0" anchor="ctr"/>
+          <a:lstStyle/>
+          <a:p>
+            <a:pPr algn="ctr"/>
+            <a:endParaRPr lang="en-US"/>
+          </a:p>
+        </p:txBody>
+      </p:sp>
+      <p:pic>
+        <p:nvPicPr>
+          <p:cNvPr id="5" name="Picture 4" descr="Chart, line chart&#10;&#10;Description automatically generated">
+            <a:extLst>
+              <a:ext uri="{FF2B5EF4-FFF2-40B4-BE49-F238E27FC236}">
+                <a16:creationId xmlns:a16="http://schemas.microsoft.com/office/drawing/2014/main" id="{C9A05B4E-3E41-47DE-844D-5C3FAA0C8D0D}"/>
+              </a:ext>
+            </a:extLst>
+          </p:cNvPr>
+          <p:cNvPicPr>
+            <a:picLocks noChangeAspect="1"/>
+          </p:cNvPicPr>
+          <p:nvPr/>
+        </p:nvPicPr>
+        <p:blipFill>
+          <a:blip r:embed="rId2"/>
+          <a:stretch>
+            <a:fillRect/>
+          </a:stretch>
+        </p:blipFill>
+        <p:spPr>
+          <a:xfrm>
+            <a:off x="4842711" y="1693200"/>
+            <a:ext cx="6543093" cy="3353334"/>
+          </a:xfrm>
+          <a:prstGeom prst="rect">
+            <a:avLst/>
+          </a:prstGeom>
+        </p:spPr>
+      </p:pic>
+      <p:sp>
+        <p:nvSpPr>
+          <p:cNvPr id="6" name="Oval 5">
+            <a:extLst>
+              <a:ext uri="{FF2B5EF4-FFF2-40B4-BE49-F238E27FC236}">
+                <a16:creationId xmlns:a16="http://schemas.microsoft.com/office/drawing/2014/main" id="{3838E1F5-B1AE-4197-BBDA-CDFC01400EC0}"/>
+              </a:ext>
+            </a:extLst>
+          </p:cNvPr>
+          <p:cNvSpPr/>
+          <p:nvPr/>
+        </p:nvSpPr>
+        <p:spPr>
+          <a:xfrm>
+            <a:off x="5850454" y="3198018"/>
+            <a:ext cx="454818" cy="461962"/>
+          </a:xfrm>
+          <a:prstGeom prst="ellipse">
+            <a:avLst/>
+          </a:prstGeom>
+          <a:noFill/>
+          <a:ln>
+            <a:solidFill>
+              <a:srgbClr val="FF0000"/>
+            </a:solidFill>
+          </a:ln>
+        </p:spPr>
+        <p:style>
+          <a:lnRef idx="2">
+            <a:schemeClr val="accent1">
+              <a:shade val="50000"/>
+            </a:schemeClr>
+          </a:lnRef>
+          <a:fillRef idx="1">
+            <a:schemeClr val="accent1"/>
+          </a:fillRef>
+          <a:effectRef idx="0">
+            <a:schemeClr val="accent1"/>
+          </a:effectRef>
+          <a:fontRef idx="minor">
+            <a:schemeClr val="lt1"/>
+          </a:fontRef>
+        </p:style>
+        <p:txBody>
+          <a:bodyPr rtlCol="0" anchor="ctr"/>
+          <a:lstStyle/>
+          <a:p>
+            <a:pPr algn="ctr"/>
+            <a:endParaRPr lang="en-US">
+              <a:noFill/>
+            </a:endParaRPr>
           </a:p>
         </p:txBody>
       </p:sp>
@@ -4980,6 +5286,63 @@
       </p:grpSpPr>
       <p:sp>
         <p:nvSpPr>
+          <p:cNvPr id="3" name="Content Placeholder 2">
+            <a:extLst>
+              <a:ext uri="{FF2B5EF4-FFF2-40B4-BE49-F238E27FC236}">
+                <a16:creationId xmlns:a16="http://schemas.microsoft.com/office/drawing/2014/main" id="{F2C59DC4-7463-443C-89B9-7B8ADFBED036}"/>
+              </a:ext>
+            </a:extLst>
+          </p:cNvPr>
+          <p:cNvSpPr>
+            <a:spLocks noGrp="1"/>
+          </p:cNvSpPr>
+          <p:nvPr>
+            <p:ph idx="1"/>
+          </p:nvPr>
+        </p:nvSpPr>
+        <p:spPr/>
+        <p:txBody>
+          <a:bodyPr/>
+          <a:lstStyle/>
+          <a:p>
+            <a:r>
+              <a:rPr lang="en-US" dirty="0"/>
+              <a:t>Maps the centroid of each cluster</a:t>
+            </a:r>
+          </a:p>
+        </p:txBody>
+      </p:sp>
+      <p:pic>
+        <p:nvPicPr>
+          <p:cNvPr id="5" name="Picture 4" descr="Chart&#10;&#10;Description automatically generated">
+            <a:extLst>
+              <a:ext uri="{FF2B5EF4-FFF2-40B4-BE49-F238E27FC236}">
+                <a16:creationId xmlns:a16="http://schemas.microsoft.com/office/drawing/2014/main" id="{D9352790-6682-4E12-8193-BC7D82649224}"/>
+              </a:ext>
+            </a:extLst>
+          </p:cNvPr>
+          <p:cNvPicPr>
+            <a:picLocks noChangeAspect="1"/>
+          </p:cNvPicPr>
+          <p:nvPr/>
+        </p:nvPicPr>
+        <p:blipFill rotWithShape="1">
+          <a:blip r:embed="rId2"/>
+          <a:srcRect t="2878"/>
+          <a:stretch/>
+        </p:blipFill>
+        <p:spPr>
+          <a:xfrm>
+            <a:off x="572044" y="783771"/>
+            <a:ext cx="11047911" cy="5987012"/>
+          </a:xfrm>
+          <a:prstGeom prst="rect">
+            <a:avLst/>
+          </a:prstGeom>
+        </p:spPr>
+      </p:pic>
+      <p:sp>
+        <p:nvSpPr>
           <p:cNvPr id="2" name="Title 1">
             <a:extLst>
               <a:ext uri="{FF2B5EF4-FFF2-40B4-BE49-F238E27FC236}">
@@ -4994,42 +5357,21 @@
             <p:ph type="title"/>
           </p:nvPr>
         </p:nvSpPr>
-        <p:spPr/>
-        <p:txBody>
-          <a:bodyPr/>
+        <p:spPr>
+          <a:xfrm>
+            <a:off x="2231136" y="180921"/>
+            <a:ext cx="7729728" cy="602850"/>
+          </a:xfrm>
+        </p:spPr>
+        <p:txBody>
+          <a:bodyPr>
+            <a:normAutofit fontScale="90000"/>
+          </a:bodyPr>
           <a:lstStyle/>
           <a:p>
             <a:r>
               <a:rPr lang="en-US" dirty="0"/>
               <a:t>Parallel Coordinates</a:t>
-            </a:r>
-          </a:p>
-        </p:txBody>
-      </p:sp>
-      <p:sp>
-        <p:nvSpPr>
-          <p:cNvPr id="3" name="Content Placeholder 2">
-            <a:extLst>
-              <a:ext uri="{FF2B5EF4-FFF2-40B4-BE49-F238E27FC236}">
-                <a16:creationId xmlns:a16="http://schemas.microsoft.com/office/drawing/2014/main" id="{F2C59DC4-7463-443C-89B9-7B8ADFBED036}"/>
-              </a:ext>
-            </a:extLst>
-          </p:cNvPr>
-          <p:cNvSpPr>
-            <a:spLocks noGrp="1"/>
-          </p:cNvSpPr>
-          <p:nvPr>
-            <p:ph idx="1"/>
-          </p:nvPr>
-        </p:nvSpPr>
-        <p:spPr/>
-        <p:txBody>
-          <a:bodyPr/>
-          <a:lstStyle/>
-          <a:p>
-            <a:r>
-              <a:rPr lang="en-US" dirty="0"/>
-              <a:t>Maps the centroid of each cluster</a:t>
             </a:r>
           </a:p>
         </p:txBody>

</xml_diff>